<commit_message>
Data section on the poster.
</commit_message>
<xml_diff>
--- a/Poster.pptx
+++ b/Poster.pptx
@@ -3203,7 +3203,7 @@
         </p:nvSpPr>
         <p:spPr>
           <a:xfrm>
-            <a:off x="15478365" y="5906693"/>
+            <a:off x="15478365" y="5906694"/>
             <a:ext cx="13222842" cy="9915027"/>
           </a:xfrm>
           <a:prstGeom prst="roundRect">
@@ -4531,6 +4531,688 @@
                   <a:lumMod val="25000"/>
                 </a:schemeClr>
               </a:solidFill>
+            </a:endParaRPr>
+          </a:p>
+        </p:txBody>
+      </p:sp>
+      <p:sp>
+        <p:nvSpPr>
+          <p:cNvPr id="21" name="TextBox 20">
+            <a:extLst>
+              <a:ext uri="{FF2B5EF4-FFF2-40B4-BE49-F238E27FC236}">
+                <a16:creationId xmlns:a16="http://schemas.microsoft.com/office/drawing/2014/main" id="{94E4A545-9FB3-4B56-AF91-48C642A4059C}"/>
+              </a:ext>
+            </a:extLst>
+          </p:cNvPr>
+          <p:cNvSpPr txBox="1"/>
+          <p:nvPr/>
+        </p:nvSpPr>
+        <p:spPr>
+          <a:xfrm>
+            <a:off x="15879486" y="7620000"/>
+            <a:ext cx="12420600" cy="7109639"/>
+          </a:xfrm>
+          <a:prstGeom prst="rect">
+            <a:avLst/>
+          </a:prstGeom>
+          <a:noFill/>
+        </p:spPr>
+        <p:txBody>
+          <a:bodyPr wrap="square" rtlCol="0">
+            <a:spAutoFit/>
+          </a:bodyPr>
+          <a:lstStyle/>
+          <a:p>
+            <a:r>
+              <a:rPr lang="et-EE" sz="2400" i="1" dirty="0" err="1"/>
+              <a:t>Our</a:t>
+            </a:r>
+            <a:r>
+              <a:rPr lang="et-EE" sz="2400" i="1" dirty="0"/>
+              <a:t> </a:t>
+            </a:r>
+            <a:r>
+              <a:rPr lang="en-US" sz="2400" i="1" dirty="0"/>
+              <a:t>database has data from different datasets, which have been combined</a:t>
+            </a:r>
+            <a:r>
+              <a:rPr lang="et-EE" sz="2400" i="1" dirty="0"/>
+              <a:t>. </a:t>
+            </a:r>
+            <a:r>
+              <a:rPr lang="en-US" sz="2400" i="1" dirty="0"/>
+              <a:t>There is data from Cleveland with 303 instances, from Hungary with 294 instances, from Switzerland with 123 instances, from Long Beach VA with 200 instances and from another general dataset with 270 instances.</a:t>
+            </a:r>
+            <a:r>
+              <a:rPr lang="et-EE" sz="2400" i="1" dirty="0"/>
+              <a:t> The </a:t>
+            </a:r>
+            <a:r>
+              <a:rPr lang="et-EE" sz="2400" i="1" dirty="0" err="1"/>
+              <a:t>features</a:t>
+            </a:r>
+            <a:r>
+              <a:rPr lang="et-EE" sz="2400" i="1" dirty="0"/>
+              <a:t> are: </a:t>
+            </a:r>
+          </a:p>
+          <a:p>
+            <a:endParaRPr lang="et-EE" sz="2400" i="1" dirty="0"/>
+          </a:p>
+          <a:p>
+            <a:pPr marL="342900" indent="-342900">
+              <a:buFont typeface="Arial" panose="020B0604020202020204" pitchFamily="34" charset="0"/>
+              <a:buChar char="•"/>
+            </a:pPr>
+            <a:r>
+              <a:rPr lang="et-EE" sz="2400" i="1" dirty="0" err="1"/>
+              <a:t>age</a:t>
+            </a:r>
+            <a:r>
+              <a:rPr lang="et-EE" sz="2400" i="1" dirty="0"/>
+              <a:t> (</a:t>
+            </a:r>
+            <a:r>
+              <a:rPr lang="et-EE" sz="2400" i="1" dirty="0" err="1"/>
+              <a:t>numeric</a:t>
+            </a:r>
+            <a:r>
+              <a:rPr lang="et-EE" sz="2400" i="1" dirty="0"/>
+              <a:t>) - </a:t>
+            </a:r>
+            <a:r>
+              <a:rPr lang="et-EE" sz="2400" dirty="0" err="1"/>
+              <a:t>Patient’s</a:t>
+            </a:r>
+            <a:r>
+              <a:rPr lang="et-EE" sz="2400" dirty="0"/>
+              <a:t> </a:t>
+            </a:r>
+            <a:r>
+              <a:rPr lang="et-EE" sz="2400" dirty="0" err="1"/>
+              <a:t>age</a:t>
+            </a:r>
+            <a:r>
+              <a:rPr lang="et-EE" sz="2400" dirty="0"/>
+              <a:t> in </a:t>
+            </a:r>
+            <a:r>
+              <a:rPr lang="et-EE" sz="2400" dirty="0" err="1"/>
+              <a:t>years</a:t>
+            </a:r>
+            <a:r>
+              <a:rPr lang="et-EE" sz="2400" dirty="0"/>
+              <a:t>.</a:t>
+            </a:r>
+            <a:endParaRPr lang="et-EE" sz="2400" i="1" dirty="0"/>
+          </a:p>
+          <a:p>
+            <a:pPr marL="342900" indent="-342900">
+              <a:buFont typeface="Arial" panose="020B0604020202020204" pitchFamily="34" charset="0"/>
+              <a:buChar char="•"/>
+            </a:pPr>
+            <a:r>
+              <a:rPr lang="et-EE" sz="2400" i="1" dirty="0" err="1"/>
+              <a:t>sex</a:t>
+            </a:r>
+            <a:r>
+              <a:rPr lang="et-EE" sz="2400" i="1" dirty="0"/>
+              <a:t> (nominaal) - </a:t>
+            </a:r>
+            <a:r>
+              <a:rPr lang="en-US" sz="2400" dirty="0"/>
+              <a:t>Patient’s gender. Male is 1 and Female is 0.</a:t>
+            </a:r>
+            <a:endParaRPr lang="et-EE" sz="2400" i="1" dirty="0"/>
+          </a:p>
+          <a:p>
+            <a:pPr marL="342900" indent="-342900">
+              <a:buFont typeface="Arial" panose="020B0604020202020204" pitchFamily="34" charset="0"/>
+              <a:buChar char="•"/>
+            </a:pPr>
+            <a:r>
+              <a:rPr lang="et-EE" sz="2400" i="1" dirty="0" err="1"/>
+              <a:t>chest</a:t>
+            </a:r>
+            <a:r>
+              <a:rPr lang="et-EE" sz="2400" i="1" dirty="0"/>
+              <a:t> </a:t>
+            </a:r>
+            <a:r>
+              <a:rPr lang="et-EE" sz="2400" i="1" dirty="0" err="1"/>
+              <a:t>pain</a:t>
+            </a:r>
+            <a:r>
+              <a:rPr lang="et-EE" sz="2400" i="1" dirty="0"/>
+              <a:t> </a:t>
+            </a:r>
+            <a:r>
+              <a:rPr lang="et-EE" sz="2400" i="1" dirty="0" err="1"/>
+              <a:t>type</a:t>
+            </a:r>
+            <a:r>
+              <a:rPr lang="et-EE" sz="2400" i="1" dirty="0"/>
+              <a:t> (</a:t>
+            </a:r>
+            <a:r>
+              <a:rPr lang="et-EE" sz="2400" i="1" dirty="0" err="1"/>
+              <a:t>categorical</a:t>
+            </a:r>
+            <a:r>
+              <a:rPr lang="et-EE" sz="2400" i="1" dirty="0"/>
+              <a:t>) - </a:t>
+            </a:r>
+            <a:r>
+              <a:rPr lang="et-EE" sz="2400" dirty="0"/>
+              <a:t>1 - </a:t>
+            </a:r>
+            <a:r>
+              <a:rPr lang="et-EE" sz="2400" dirty="0" err="1"/>
+              <a:t>typical</a:t>
+            </a:r>
+            <a:r>
+              <a:rPr lang="et-EE" sz="2400" dirty="0"/>
+              <a:t>; 2 - </a:t>
+            </a:r>
+            <a:r>
+              <a:rPr lang="et-EE" sz="2400" dirty="0" err="1"/>
+              <a:t>typical</a:t>
+            </a:r>
+            <a:r>
+              <a:rPr lang="et-EE" sz="2400" dirty="0"/>
+              <a:t> </a:t>
+            </a:r>
+            <a:r>
+              <a:rPr lang="et-EE" sz="2400" dirty="0" err="1"/>
+              <a:t>angina</a:t>
+            </a:r>
+            <a:r>
+              <a:rPr lang="et-EE" sz="2400" dirty="0"/>
+              <a:t>; 3 - non-</a:t>
+            </a:r>
+            <a:r>
+              <a:rPr lang="et-EE" sz="2400" dirty="0" err="1"/>
+              <a:t>angina</a:t>
+            </a:r>
+            <a:r>
+              <a:rPr lang="et-EE" sz="2400" dirty="0"/>
+              <a:t>; 4 - </a:t>
+            </a:r>
+            <a:r>
+              <a:rPr lang="et-EE" sz="2400" dirty="0" err="1"/>
+              <a:t>asymptomatic</a:t>
+            </a:r>
+            <a:r>
+              <a:rPr lang="et-EE" sz="2400" dirty="0"/>
+              <a:t>.</a:t>
+            </a:r>
+            <a:endParaRPr lang="et-EE" sz="2400" i="1" dirty="0"/>
+          </a:p>
+          <a:p>
+            <a:pPr marL="342900" indent="-342900">
+              <a:buFont typeface="Arial" panose="020B0604020202020204" pitchFamily="34" charset="0"/>
+              <a:buChar char="•"/>
+            </a:pPr>
+            <a:r>
+              <a:rPr lang="et-EE" sz="2400" i="1" dirty="0" err="1"/>
+              <a:t>resting</a:t>
+            </a:r>
+            <a:r>
+              <a:rPr lang="et-EE" sz="2400" i="1" dirty="0"/>
+              <a:t> </a:t>
+            </a:r>
+            <a:r>
+              <a:rPr lang="et-EE" sz="2400" i="1" dirty="0" err="1"/>
+              <a:t>bs</a:t>
+            </a:r>
+            <a:r>
+              <a:rPr lang="et-EE" sz="2400" i="1" dirty="0"/>
+              <a:t> s (</a:t>
+            </a:r>
+            <a:r>
+              <a:rPr lang="et-EE" sz="2400" i="1" dirty="0" err="1"/>
+              <a:t>numeric</a:t>
+            </a:r>
+            <a:r>
+              <a:rPr lang="et-EE" sz="2400" i="1" dirty="0"/>
+              <a:t>) -  </a:t>
+            </a:r>
+            <a:r>
+              <a:rPr lang="en-US" sz="2400" dirty="0"/>
+              <a:t>Level of blood pressure at resting mode in mm/GG.</a:t>
+            </a:r>
+            <a:endParaRPr lang="et-EE" sz="2400" i="1" dirty="0"/>
+          </a:p>
+          <a:p>
+            <a:pPr marL="342900" indent="-342900">
+              <a:buFont typeface="Arial" panose="020B0604020202020204" pitchFamily="34" charset="0"/>
+              <a:buChar char="•"/>
+            </a:pPr>
+            <a:r>
+              <a:rPr lang="et-EE" sz="2400" i="1" dirty="0" err="1"/>
+              <a:t>cholesterol</a:t>
+            </a:r>
+            <a:r>
+              <a:rPr lang="et-EE" sz="2400" i="1" dirty="0"/>
+              <a:t> (</a:t>
+            </a:r>
+            <a:r>
+              <a:rPr lang="et-EE" sz="2400" i="1" dirty="0" err="1"/>
+              <a:t>numeric</a:t>
+            </a:r>
+            <a:r>
+              <a:rPr lang="et-EE" sz="2400" i="1" dirty="0"/>
+              <a:t>) - </a:t>
+            </a:r>
+            <a:r>
+              <a:rPr lang="nl-NL" sz="2400" dirty="0"/>
+              <a:t>Serum cholesterol in mg/dl.</a:t>
+            </a:r>
+            <a:endParaRPr lang="et-EE" sz="2400" i="1" dirty="0"/>
+          </a:p>
+          <a:p>
+            <a:pPr marL="342900" indent="-342900">
+              <a:buFont typeface="Arial" panose="020B0604020202020204" pitchFamily="34" charset="0"/>
+              <a:buChar char="•"/>
+            </a:pPr>
+            <a:r>
+              <a:rPr lang="et-EE" sz="2400" i="1" dirty="0" err="1"/>
+              <a:t>fasting</a:t>
+            </a:r>
+            <a:r>
+              <a:rPr lang="et-EE" sz="2400" i="1" dirty="0"/>
+              <a:t> </a:t>
+            </a:r>
+            <a:r>
+              <a:rPr lang="et-EE" sz="2400" i="1" dirty="0" err="1"/>
+              <a:t>blood</a:t>
+            </a:r>
+            <a:r>
+              <a:rPr lang="et-EE" sz="2400" i="1" dirty="0"/>
+              <a:t> </a:t>
+            </a:r>
+            <a:r>
+              <a:rPr lang="et-EE" sz="2400" i="1" dirty="0" err="1"/>
+              <a:t>sugar</a:t>
+            </a:r>
+            <a:r>
+              <a:rPr lang="et-EE" sz="2400" i="1" dirty="0"/>
+              <a:t> (</a:t>
+            </a:r>
+            <a:r>
+              <a:rPr lang="et-EE" sz="2400" i="1" dirty="0" err="1"/>
+              <a:t>nominal</a:t>
+            </a:r>
+            <a:r>
+              <a:rPr lang="et-EE" sz="2400" i="1" dirty="0"/>
+              <a:t>) - </a:t>
+            </a:r>
+            <a:r>
+              <a:rPr lang="en-US" sz="2400" dirty="0"/>
+              <a:t>Blood sugar levels on fasting &gt; 120 mg/dl represent 1 in case of true and 0 as false.</a:t>
+            </a:r>
+            <a:endParaRPr lang="et-EE" sz="2400" i="1" dirty="0"/>
+          </a:p>
+          <a:p>
+            <a:pPr marL="342900" indent="-342900">
+              <a:buFont typeface="Arial" panose="020B0604020202020204" pitchFamily="34" charset="0"/>
+              <a:buChar char="•"/>
+            </a:pPr>
+            <a:r>
+              <a:rPr lang="et-EE" sz="2400" i="1" dirty="0" err="1"/>
+              <a:t>resting</a:t>
+            </a:r>
+            <a:r>
+              <a:rPr lang="et-EE" sz="2400" i="1" dirty="0"/>
+              <a:t> </a:t>
+            </a:r>
+            <a:r>
+              <a:rPr lang="et-EE" sz="2400" i="1" dirty="0" err="1"/>
+              <a:t>ecg</a:t>
+            </a:r>
+            <a:r>
+              <a:rPr lang="et-EE" sz="2400" i="1" dirty="0"/>
+              <a:t>. (</a:t>
+            </a:r>
+            <a:r>
+              <a:rPr lang="et-EE" sz="2400" i="1" dirty="0" err="1"/>
+              <a:t>categorical</a:t>
+            </a:r>
+            <a:r>
+              <a:rPr lang="et-EE" sz="2400" i="1" dirty="0"/>
+              <a:t>) - </a:t>
+            </a:r>
+            <a:r>
+              <a:rPr lang="en-US" sz="2400" dirty="0"/>
+              <a:t>0: Normal</a:t>
+            </a:r>
+            <a:r>
+              <a:rPr lang="et-EE" sz="2400" dirty="0"/>
+              <a:t>,</a:t>
+            </a:r>
+            <a:r>
+              <a:rPr lang="en-US" sz="2400" dirty="0"/>
+              <a:t> 1: Abnormality in ST-T wave</a:t>
+            </a:r>
+            <a:r>
+              <a:rPr lang="et-EE" sz="2400" dirty="0"/>
+              <a:t>,</a:t>
+            </a:r>
+            <a:r>
+              <a:rPr lang="en-US" sz="2400" dirty="0"/>
+              <a:t> 2: Left ventricular hypertrophy</a:t>
+            </a:r>
+            <a:endParaRPr lang="et-EE" sz="2400" i="1" dirty="0"/>
+          </a:p>
+          <a:p>
+            <a:pPr marL="342900" indent="-342900">
+              <a:buFont typeface="Arial" panose="020B0604020202020204" pitchFamily="34" charset="0"/>
+              <a:buChar char="•"/>
+            </a:pPr>
+            <a:r>
+              <a:rPr lang="et-EE" sz="2400" i="1" dirty="0" err="1"/>
+              <a:t>max</a:t>
+            </a:r>
+            <a:r>
+              <a:rPr lang="et-EE" sz="2400" i="1" dirty="0"/>
+              <a:t> </a:t>
+            </a:r>
+            <a:r>
+              <a:rPr lang="et-EE" sz="2400" i="1" dirty="0" err="1"/>
+              <a:t>heart</a:t>
+            </a:r>
+            <a:r>
+              <a:rPr lang="et-EE" sz="2400" i="1" dirty="0"/>
+              <a:t> </a:t>
+            </a:r>
+            <a:r>
+              <a:rPr lang="et-EE" sz="2400" i="1" dirty="0" err="1"/>
+              <a:t>rate</a:t>
+            </a:r>
+            <a:r>
+              <a:rPr lang="et-EE" sz="2400" i="1" dirty="0"/>
+              <a:t> (</a:t>
+            </a:r>
+            <a:r>
+              <a:rPr lang="et-EE" sz="2400" i="1" dirty="0" err="1"/>
+              <a:t>numeric</a:t>
+            </a:r>
+            <a:r>
+              <a:rPr lang="et-EE" sz="2400" i="1" dirty="0"/>
+              <a:t>) - </a:t>
+            </a:r>
+            <a:r>
+              <a:rPr lang="et-EE" sz="2400" dirty="0" err="1"/>
+              <a:t>Maximum</a:t>
+            </a:r>
+            <a:r>
+              <a:rPr lang="et-EE" sz="2400" dirty="0"/>
+              <a:t> </a:t>
+            </a:r>
+            <a:r>
+              <a:rPr lang="et-EE" sz="2400" dirty="0" err="1"/>
+              <a:t>heart</a:t>
+            </a:r>
+            <a:r>
+              <a:rPr lang="et-EE" sz="2400" dirty="0"/>
+              <a:t> </a:t>
+            </a:r>
+            <a:r>
+              <a:rPr lang="et-EE" sz="2400" dirty="0" err="1"/>
+              <a:t>rate</a:t>
+            </a:r>
+            <a:r>
+              <a:rPr lang="et-EE" sz="2400" dirty="0"/>
+              <a:t> </a:t>
+            </a:r>
+            <a:r>
+              <a:rPr lang="et-EE" sz="2400" dirty="0" err="1"/>
+              <a:t>achieved</a:t>
+            </a:r>
+            <a:endParaRPr lang="et-EE" sz="2400" i="1" dirty="0"/>
+          </a:p>
+          <a:p>
+            <a:pPr marL="342900" indent="-342900">
+              <a:buFont typeface="Arial" panose="020B0604020202020204" pitchFamily="34" charset="0"/>
+              <a:buChar char="•"/>
+            </a:pPr>
+            <a:r>
+              <a:rPr lang="et-EE" sz="2400" i="1" dirty="0" err="1"/>
+              <a:t>exercise</a:t>
+            </a:r>
+            <a:r>
+              <a:rPr lang="et-EE" sz="2400" i="1" dirty="0"/>
+              <a:t> </a:t>
+            </a:r>
+            <a:r>
+              <a:rPr lang="et-EE" sz="2400" i="1" dirty="0" err="1"/>
+              <a:t>angina</a:t>
+            </a:r>
+            <a:r>
+              <a:rPr lang="et-EE" sz="2400" i="1" dirty="0"/>
+              <a:t> (</a:t>
+            </a:r>
+            <a:r>
+              <a:rPr lang="et-EE" sz="2400" i="1" dirty="0" err="1"/>
+              <a:t>nominal</a:t>
+            </a:r>
+            <a:r>
+              <a:rPr lang="et-EE" sz="2400" i="1" dirty="0"/>
+              <a:t>) - </a:t>
+            </a:r>
+            <a:r>
+              <a:rPr lang="en-US" sz="2400" dirty="0"/>
+              <a:t>Angina induced by exercise 0: no and 1: yes</a:t>
+            </a:r>
+            <a:endParaRPr lang="et-EE" sz="2400" i="1" dirty="0"/>
+          </a:p>
+          <a:p>
+            <a:pPr marL="342900" indent="-342900">
+              <a:buFont typeface="Arial" panose="020B0604020202020204" pitchFamily="34" charset="0"/>
+              <a:buChar char="•"/>
+            </a:pPr>
+            <a:r>
+              <a:rPr lang="et-EE" sz="2400" i="1" dirty="0" err="1"/>
+              <a:t>oldpeak</a:t>
+            </a:r>
+            <a:r>
+              <a:rPr lang="et-EE" sz="2400" i="1" dirty="0"/>
+              <a:t> (</a:t>
+            </a:r>
+            <a:r>
+              <a:rPr lang="et-EE" sz="2400" i="1" dirty="0" err="1"/>
+              <a:t>numeric</a:t>
+            </a:r>
+            <a:r>
+              <a:rPr lang="et-EE" sz="2400" i="1" dirty="0"/>
+              <a:t>) - </a:t>
+            </a:r>
+            <a:r>
+              <a:rPr lang="en-US" sz="2400" dirty="0"/>
+              <a:t>Exercise induced ST-depression in comparison with the state of rest.</a:t>
+            </a:r>
+            <a:endParaRPr lang="et-EE" sz="2400" i="1" dirty="0"/>
+          </a:p>
+          <a:p>
+            <a:pPr marL="342900" indent="-342900">
+              <a:buFont typeface="Arial" panose="020B0604020202020204" pitchFamily="34" charset="0"/>
+              <a:buChar char="•"/>
+            </a:pPr>
+            <a:r>
+              <a:rPr lang="et-EE" sz="2400" i="1" dirty="0"/>
+              <a:t>ST </a:t>
+            </a:r>
+            <a:r>
+              <a:rPr lang="et-EE" sz="2400" i="1" dirty="0" err="1"/>
+              <a:t>slope</a:t>
+            </a:r>
+            <a:r>
+              <a:rPr lang="et-EE" sz="2400" i="1" dirty="0"/>
+              <a:t> (</a:t>
+            </a:r>
+            <a:r>
+              <a:rPr lang="et-EE" sz="2400" i="1" dirty="0" err="1"/>
+              <a:t>categorical</a:t>
+            </a:r>
+            <a:r>
+              <a:rPr lang="et-EE" sz="2400" i="1" dirty="0"/>
+              <a:t>) - </a:t>
+            </a:r>
+            <a:r>
+              <a:rPr lang="en-US" sz="2400" dirty="0"/>
+              <a:t>0: Normal 1: Upsloping 2: Flat 3: </a:t>
+            </a:r>
+            <a:r>
+              <a:rPr lang="en-US" sz="2400" dirty="0" err="1"/>
+              <a:t>Downsloping</a:t>
+            </a:r>
+            <a:endParaRPr lang="et-EE" sz="2400" i="1" dirty="0"/>
+          </a:p>
+          <a:p>
+            <a:pPr marL="342900" indent="-342900">
+              <a:buFont typeface="Arial" panose="020B0604020202020204" pitchFamily="34" charset="0"/>
+              <a:buChar char="•"/>
+            </a:pPr>
+            <a:r>
+              <a:rPr lang="et-EE" sz="2400" i="1" dirty="0" err="1"/>
+              <a:t>target</a:t>
+            </a:r>
+            <a:r>
+              <a:rPr lang="et-EE" sz="2400" i="1" dirty="0"/>
+              <a:t> (</a:t>
+            </a:r>
+            <a:r>
+              <a:rPr lang="et-EE" sz="2400" i="1" dirty="0" err="1"/>
+              <a:t>nominal</a:t>
+            </a:r>
+            <a:r>
+              <a:rPr lang="et-EE" sz="2400" i="1" dirty="0"/>
+              <a:t>) - </a:t>
+            </a:r>
+            <a:r>
+              <a:rPr lang="en-US" sz="2400" dirty="0"/>
+              <a:t>Heart risk, 1: heart disease 0: normal</a:t>
+            </a:r>
+            <a:endParaRPr lang="et-EE" sz="2400" i="1" dirty="0"/>
+          </a:p>
+        </p:txBody>
+      </p:sp>
+      <p:sp>
+        <p:nvSpPr>
+          <p:cNvPr id="23" name="Rectangle 1">
+            <a:extLst>
+              <a:ext uri="{FF2B5EF4-FFF2-40B4-BE49-F238E27FC236}">
+                <a16:creationId xmlns:a16="http://schemas.microsoft.com/office/drawing/2014/main" id="{6C5F1EF6-946E-4853-8316-766EB185B1A6}"/>
+              </a:ext>
+            </a:extLst>
+          </p:cNvPr>
+          <p:cNvSpPr>
+            <a:spLocks noChangeArrowheads="1"/>
+          </p:cNvSpPr>
+          <p:nvPr/>
+        </p:nvSpPr>
+        <p:spPr bwMode="auto">
+          <a:xfrm>
+            <a:off x="0" y="0"/>
+            <a:ext cx="30275213" cy="457200"/>
+          </a:xfrm>
+          <a:prstGeom prst="rect">
+            <a:avLst/>
+          </a:prstGeom>
+          <a:noFill/>
+          <a:ln>
+            <a:noFill/>
+          </a:ln>
+          <a:effectLst/>
+          <a:extLst>
+            <a:ext uri="{909E8E84-426E-40DD-AFC4-6F175D3DCCD1}">
+              <a14:hiddenFill xmlns:a14="http://schemas.microsoft.com/office/drawing/2010/main">
+                <a:solidFill>
+                  <a:schemeClr val="accent1"/>
+                </a:solidFill>
+              </a14:hiddenFill>
+            </a:ext>
+            <a:ext uri="{91240B29-F687-4F45-9708-019B960494DF}">
+              <a14:hiddenLine xmlns:a14="http://schemas.microsoft.com/office/drawing/2010/main" w="9525">
+                <a:solidFill>
+                  <a:schemeClr val="tx1"/>
+                </a:solidFill>
+                <a:miter lim="800000"/>
+                <a:headEnd/>
+                <a:tailEnd/>
+              </a14:hiddenLine>
+            </a:ext>
+            <a:ext uri="{AF507438-7753-43E0-B8FC-AC1667EBCBE1}">
+              <a14:hiddenEffects xmlns:a14="http://schemas.microsoft.com/office/drawing/2010/main">
+                <a:effectLst>
+                  <a:outerShdw dist="35921" dir="2700000" algn="ctr" rotWithShape="0">
+                    <a:schemeClr val="bg2"/>
+                  </a:outerShdw>
+                </a:effectLst>
+              </a14:hiddenEffects>
+            </a:ext>
+          </a:extLst>
+        </p:spPr>
+        <p:txBody>
+          <a:bodyPr vert="horz" wrap="none" lIns="91440" tIns="45720" rIns="91440" bIns="45720" numCol="1" anchor="ctr" anchorCtr="0" compatLnSpc="1">
+            <a:prstTxWarp prst="textNoShape">
+              <a:avLst/>
+            </a:prstTxWarp>
+            <a:spAutoFit/>
+          </a:bodyPr>
+          <a:lstStyle/>
+          <a:p>
+            <a:pPr marL="0" marR="0" lvl="0" indent="0" algn="l" defTabSz="914400" rtl="0" eaLnBrk="0" fontAlgn="base" latinLnBrk="0" hangingPunct="0">
+              <a:lnSpc>
+                <a:spcPct val="100000"/>
+              </a:lnSpc>
+              <a:spcBef>
+                <a:spcPct val="0"/>
+              </a:spcBef>
+              <a:spcAft>
+                <a:spcPct val="0"/>
+              </a:spcAft>
+              <a:buClrTx/>
+              <a:buSzTx/>
+              <a:buFontTx/>
+              <a:buNone/>
+              <a:tabLst/>
+            </a:pPr>
+            <a:r>
+              <a:rPr kumimoji="0" lang="et-EE" altLang="et-EE" sz="1100" b="0" i="0" u="none" strike="noStrike" cap="none" normalizeH="0" baseline="0">
+                <a:ln>
+                  <a:noFill/>
+                </a:ln>
+                <a:solidFill>
+                  <a:srgbClr val="000000"/>
+                </a:solidFill>
+                <a:effectLst/>
+                <a:latin typeface="Arial" panose="020B0604020202020204" pitchFamily="34" charset="0"/>
+                <a:cs typeface="Arial" panose="020B0604020202020204" pitchFamily="34" charset="0"/>
+              </a:rPr>
+              <a:t>ST slope (categorical)</a:t>
+            </a:r>
+            <a:r>
+              <a:rPr kumimoji="0" lang="et-EE" altLang="et-EE" sz="1900" b="0" i="0" u="none" strike="noStrike" cap="none" normalizeH="0" baseline="0">
+                <a:ln>
+                  <a:noFill/>
+                </a:ln>
+                <a:solidFill>
+                  <a:schemeClr val="tx1"/>
+                </a:solidFill>
+                <a:effectLst/>
+              </a:rPr>
+              <a:t> </a:t>
+            </a:r>
+            <a:endParaRPr kumimoji="0" lang="et-EE" altLang="et-EE" sz="1800" b="0" i="0" u="none" strike="noStrike" cap="none" normalizeH="0" baseline="0">
+              <a:ln>
+                <a:noFill/>
+              </a:ln>
+              <a:solidFill>
+                <a:schemeClr val="tx1"/>
+              </a:solidFill>
+              <a:effectLst/>
+              <a:latin typeface="Arial" panose="020B0604020202020204" pitchFamily="34" charset="0"/>
             </a:endParaRPr>
           </a:p>
         </p:txBody>

</xml_diff>

<commit_message>
Text on the poster.
</commit_message>
<xml_diff>
--- a/Poster.pptx
+++ b/Poster.pptx
@@ -3546,7 +3546,7 @@
         </p:nvSpPr>
         <p:spPr>
           <a:xfrm>
-            <a:off x="1574007" y="33159192"/>
+            <a:off x="1574004" y="33399781"/>
             <a:ext cx="27127199" cy="8897752"/>
           </a:xfrm>
           <a:prstGeom prst="roundRect">
@@ -3590,10 +3590,10 @@
       </p:sp>
       <p:pic>
         <p:nvPicPr>
-          <p:cNvPr id="1028" name="Picture 4">
+          <p:cNvPr id="1032" name="Picture 8">
             <a:extLst>
               <a:ext uri="{FF2B5EF4-FFF2-40B4-BE49-F238E27FC236}">
-                <a16:creationId xmlns:a16="http://schemas.microsoft.com/office/drawing/2014/main" id="{89225613-CD15-41F8-8BA5-9F99BC0D3E66}"/>
+                <a16:creationId xmlns:a16="http://schemas.microsoft.com/office/drawing/2014/main" id="{8D23C896-F8AF-4AEE-856A-A2E78680547D}"/>
               </a:ext>
             </a:extLst>
           </p:cNvPr>
@@ -3617,8 +3617,8 @@
         </p:blipFill>
         <p:spPr bwMode="auto">
           <a:xfrm>
-            <a:off x="17153334" y="33509118"/>
-            <a:ext cx="10720863" cy="8166775"/>
+            <a:off x="16759952" y="16443176"/>
+            <a:ext cx="11114245" cy="8670841"/>
           </a:xfrm>
           <a:prstGeom prst="rect">
             <a:avLst/>
@@ -3637,10 +3637,10 @@
       </p:pic>
       <p:pic>
         <p:nvPicPr>
-          <p:cNvPr id="1032" name="Picture 8">
+          <p:cNvPr id="1034" name="Picture 10">
             <a:extLst>
               <a:ext uri="{FF2B5EF4-FFF2-40B4-BE49-F238E27FC236}">
-                <a16:creationId xmlns:a16="http://schemas.microsoft.com/office/drawing/2014/main" id="{8D23C896-F8AF-4AEE-856A-A2E78680547D}"/>
+                <a16:creationId xmlns:a16="http://schemas.microsoft.com/office/drawing/2014/main" id="{FC95D01C-19AE-4973-AB55-BD930EADBCEE}"/>
               </a:ext>
             </a:extLst>
           </p:cNvPr>
@@ -3664,53 +3664,6 @@
         </p:blipFill>
         <p:spPr bwMode="auto">
           <a:xfrm>
-            <a:off x="16759952" y="16443176"/>
-            <a:ext cx="11114245" cy="8670841"/>
-          </a:xfrm>
-          <a:prstGeom prst="rect">
-            <a:avLst/>
-          </a:prstGeom>
-          <a:noFill/>
-          <a:extLst>
-            <a:ext uri="{909E8E84-426E-40DD-AFC4-6F175D3DCCD1}">
-              <a14:hiddenFill xmlns:a14="http://schemas.microsoft.com/office/drawing/2010/main">
-                <a:solidFill>
-                  <a:srgbClr val="FFFFFF"/>
-                </a:solidFill>
-              </a14:hiddenFill>
-            </a:ext>
-          </a:extLst>
-        </p:spPr>
-      </p:pic>
-      <p:pic>
-        <p:nvPicPr>
-          <p:cNvPr id="1034" name="Picture 10">
-            <a:extLst>
-              <a:ext uri="{FF2B5EF4-FFF2-40B4-BE49-F238E27FC236}">
-                <a16:creationId xmlns:a16="http://schemas.microsoft.com/office/drawing/2014/main" id="{FC95D01C-19AE-4973-AB55-BD930EADBCEE}"/>
-              </a:ext>
-            </a:extLst>
-          </p:cNvPr>
-          <p:cNvPicPr>
-            <a:picLocks noChangeAspect="1" noChangeArrowheads="1"/>
-          </p:cNvPicPr>
-          <p:nvPr/>
-        </p:nvPicPr>
-        <p:blipFill>
-          <a:blip r:embed="rId4">
-            <a:extLst>
-              <a:ext uri="{28A0092B-C50C-407E-A947-70E740481C1C}">
-                <a14:useLocalDpi xmlns:a14="http://schemas.microsoft.com/office/drawing/2010/main" val="0"/>
-              </a:ext>
-            </a:extLst>
-          </a:blip>
-          <a:srcRect/>
-          <a:stretch>
-            <a:fillRect/>
-          </a:stretch>
-        </p:blipFill>
-        <p:spPr bwMode="auto">
-          <a:xfrm>
             <a:off x="3092291" y="26133333"/>
             <a:ext cx="6051709" cy="3894453"/>
           </a:xfrm>
@@ -3744,7 +3697,7 @@
           <p:nvPr/>
         </p:nvPicPr>
         <p:blipFill>
-          <a:blip r:embed="rId5"/>
+          <a:blip r:embed="rId4"/>
           <a:stretch>
             <a:fillRect/>
           </a:stretch>
@@ -3850,7 +3803,7 @@
         </p:nvSpPr>
         <p:spPr>
           <a:xfrm>
-            <a:off x="8416885" y="33509118"/>
+            <a:off x="4497952" y="33631844"/>
             <a:ext cx="3718560" cy="1200329"/>
           </a:xfrm>
           <a:prstGeom prst="rect">
@@ -4549,8 +4502,8 @@
         </p:nvSpPr>
         <p:spPr>
           <a:xfrm>
-            <a:off x="15879486" y="7620000"/>
-            <a:ext cx="12420600" cy="7109639"/>
+            <a:off x="15879486" y="7307643"/>
+            <a:ext cx="12420600" cy="8094524"/>
           </a:xfrm>
           <a:prstGeom prst="rect">
             <a:avLst/>
@@ -4564,40 +4517,40 @@
           <a:lstStyle/>
           <a:p>
             <a:r>
-              <a:rPr lang="et-EE" sz="2400" i="1" dirty="0" err="1"/>
+              <a:rPr lang="et-EE" sz="2600" i="1" dirty="0" err="1"/>
               <a:t>Our</a:t>
             </a:r>
             <a:r>
-              <a:rPr lang="et-EE" sz="2400" i="1" dirty="0"/>
+              <a:rPr lang="et-EE" sz="2600" i="1" dirty="0"/>
               <a:t> </a:t>
             </a:r>
             <a:r>
-              <a:rPr lang="en-US" sz="2400" i="1" dirty="0"/>
+              <a:rPr lang="en-US" sz="2600" i="1" dirty="0"/>
               <a:t>database has data from different datasets, which have been combined</a:t>
             </a:r>
             <a:r>
-              <a:rPr lang="et-EE" sz="2400" i="1" dirty="0"/>
+              <a:rPr lang="et-EE" sz="2600" i="1" dirty="0"/>
               <a:t>. </a:t>
             </a:r>
             <a:r>
-              <a:rPr lang="en-US" sz="2400" i="1" dirty="0"/>
+              <a:rPr lang="en-US" sz="2600" i="1" dirty="0"/>
               <a:t>There is data from Cleveland with 303 instances, from Hungary with 294 instances, from Switzerland with 123 instances, from Long Beach VA with 200 instances and from another general dataset with 270 instances.</a:t>
             </a:r>
             <a:r>
-              <a:rPr lang="et-EE" sz="2400" i="1" dirty="0"/>
+              <a:rPr lang="et-EE" sz="2600" i="1" dirty="0"/>
               <a:t> The </a:t>
             </a:r>
             <a:r>
-              <a:rPr lang="et-EE" sz="2400" i="1" dirty="0" err="1"/>
+              <a:rPr lang="et-EE" sz="2600" i="1" dirty="0" err="1"/>
               <a:t>features</a:t>
             </a:r>
             <a:r>
-              <a:rPr lang="et-EE" sz="2400" i="1" dirty="0"/>
+              <a:rPr lang="et-EE" sz="2600" i="1" dirty="0"/>
               <a:t> are: </a:t>
             </a:r>
           </a:p>
           <a:p>
-            <a:endParaRPr lang="et-EE" sz="2400" i="1" dirty="0"/>
+            <a:endParaRPr lang="et-EE" sz="2600" i="1" dirty="0"/>
           </a:p>
           <a:p>
             <a:pPr marL="342900" indent="-342900">
@@ -4605,46 +4558,46 @@
               <a:buChar char="•"/>
             </a:pPr>
             <a:r>
-              <a:rPr lang="et-EE" sz="2400" i="1" dirty="0" err="1"/>
+              <a:rPr lang="et-EE" sz="2600" i="1" dirty="0" err="1"/>
               <a:t>age</a:t>
             </a:r>
             <a:r>
-              <a:rPr lang="et-EE" sz="2400" i="1" dirty="0"/>
+              <a:rPr lang="et-EE" sz="2600" i="1" dirty="0"/>
               <a:t> (</a:t>
             </a:r>
             <a:r>
-              <a:rPr lang="et-EE" sz="2400" i="1" dirty="0" err="1"/>
+              <a:rPr lang="et-EE" sz="2600" i="1" dirty="0" err="1"/>
               <a:t>numeric</a:t>
             </a:r>
             <a:r>
-              <a:rPr lang="et-EE" sz="2400" i="1" dirty="0"/>
+              <a:rPr lang="et-EE" sz="2600" i="1" dirty="0"/>
               <a:t>) - </a:t>
             </a:r>
             <a:r>
-              <a:rPr lang="et-EE" sz="2400" dirty="0" err="1"/>
+              <a:rPr lang="et-EE" sz="2600" dirty="0" err="1"/>
               <a:t>Patient’s</a:t>
             </a:r>
             <a:r>
-              <a:rPr lang="et-EE" sz="2400" dirty="0"/>
+              <a:rPr lang="et-EE" sz="2600" dirty="0"/>
               <a:t> </a:t>
             </a:r>
             <a:r>
-              <a:rPr lang="et-EE" sz="2400" dirty="0" err="1"/>
+              <a:rPr lang="et-EE" sz="2600" dirty="0" err="1"/>
               <a:t>age</a:t>
             </a:r>
             <a:r>
-              <a:rPr lang="et-EE" sz="2400" dirty="0"/>
+              <a:rPr lang="et-EE" sz="2600" dirty="0"/>
               <a:t> in </a:t>
             </a:r>
             <a:r>
-              <a:rPr lang="et-EE" sz="2400" dirty="0" err="1"/>
+              <a:rPr lang="et-EE" sz="2600" dirty="0" err="1"/>
               <a:t>years</a:t>
             </a:r>
             <a:r>
-              <a:rPr lang="et-EE" sz="2400" dirty="0"/>
+              <a:rPr lang="et-EE" sz="2600" dirty="0"/>
               <a:t>.</a:t>
             </a:r>
-            <a:endParaRPr lang="et-EE" sz="2400" i="1" dirty="0"/>
+            <a:endParaRPr lang="et-EE" sz="2600" i="1" dirty="0"/>
           </a:p>
           <a:p>
             <a:pPr marL="342900" indent="-342900">
@@ -4652,18 +4605,18 @@
               <a:buChar char="•"/>
             </a:pPr>
             <a:r>
-              <a:rPr lang="et-EE" sz="2400" i="1" dirty="0" err="1"/>
+              <a:rPr lang="et-EE" sz="2600" i="1" dirty="0" err="1"/>
               <a:t>sex</a:t>
             </a:r>
             <a:r>
-              <a:rPr lang="et-EE" sz="2400" i="1" dirty="0"/>
+              <a:rPr lang="et-EE" sz="2600" i="1" dirty="0"/>
               <a:t> (nominaal) - </a:t>
             </a:r>
             <a:r>
-              <a:rPr lang="en-US" sz="2400" dirty="0"/>
+              <a:rPr lang="en-US" sz="2600" dirty="0"/>
               <a:t>Patient’s gender. Male is 1 and Female is 0.</a:t>
             </a:r>
-            <a:endParaRPr lang="et-EE" sz="2400" i="1" dirty="0"/>
+            <a:endParaRPr lang="et-EE" sz="2600" i="1" dirty="0"/>
           </a:p>
           <a:p>
             <a:pPr marL="342900" indent="-342900">
@@ -4671,82 +4624,82 @@
               <a:buChar char="•"/>
             </a:pPr>
             <a:r>
-              <a:rPr lang="et-EE" sz="2400" i="1" dirty="0" err="1"/>
+              <a:rPr lang="et-EE" sz="2600" i="1" dirty="0" err="1"/>
               <a:t>chest</a:t>
             </a:r>
             <a:r>
-              <a:rPr lang="et-EE" sz="2400" i="1" dirty="0"/>
+              <a:rPr lang="et-EE" sz="2600" i="1" dirty="0"/>
               <a:t> </a:t>
             </a:r>
             <a:r>
-              <a:rPr lang="et-EE" sz="2400" i="1" dirty="0" err="1"/>
+              <a:rPr lang="et-EE" sz="2600" i="1" dirty="0" err="1"/>
               <a:t>pain</a:t>
             </a:r>
             <a:r>
-              <a:rPr lang="et-EE" sz="2400" i="1" dirty="0"/>
+              <a:rPr lang="et-EE" sz="2600" i="1" dirty="0"/>
               <a:t> </a:t>
             </a:r>
             <a:r>
-              <a:rPr lang="et-EE" sz="2400" i="1" dirty="0" err="1"/>
+              <a:rPr lang="et-EE" sz="2600" i="1" dirty="0" err="1"/>
               <a:t>type</a:t>
             </a:r>
             <a:r>
-              <a:rPr lang="et-EE" sz="2400" i="1" dirty="0"/>
+              <a:rPr lang="et-EE" sz="2600" i="1" dirty="0"/>
               <a:t> (</a:t>
             </a:r>
             <a:r>
-              <a:rPr lang="et-EE" sz="2400" i="1" dirty="0" err="1"/>
+              <a:rPr lang="et-EE" sz="2600" i="1" dirty="0" err="1"/>
               <a:t>categorical</a:t>
             </a:r>
             <a:r>
-              <a:rPr lang="et-EE" sz="2400" i="1" dirty="0"/>
+              <a:rPr lang="et-EE" sz="2600" i="1" dirty="0"/>
               <a:t>) - </a:t>
             </a:r>
             <a:r>
-              <a:rPr lang="et-EE" sz="2400" dirty="0"/>
+              <a:rPr lang="et-EE" sz="2600" dirty="0"/>
               <a:t>1 - </a:t>
             </a:r>
             <a:r>
-              <a:rPr lang="et-EE" sz="2400" dirty="0" err="1"/>
+              <a:rPr lang="et-EE" sz="2600" dirty="0" err="1"/>
               <a:t>typical</a:t>
             </a:r>
             <a:r>
-              <a:rPr lang="et-EE" sz="2400" dirty="0"/>
+              <a:rPr lang="et-EE" sz="2600" dirty="0"/>
               <a:t>; 2 - </a:t>
             </a:r>
             <a:r>
-              <a:rPr lang="et-EE" sz="2400" dirty="0" err="1"/>
+              <a:rPr lang="et-EE" sz="2600" dirty="0" err="1"/>
               <a:t>typical</a:t>
             </a:r>
             <a:r>
-              <a:rPr lang="et-EE" sz="2400" dirty="0"/>
+              <a:rPr lang="et-EE" sz="2600" dirty="0"/>
               <a:t> </a:t>
             </a:r>
             <a:r>
-              <a:rPr lang="et-EE" sz="2400" dirty="0" err="1"/>
+              <a:rPr lang="et-EE" sz="2600" dirty="0" err="1"/>
               <a:t>angina</a:t>
             </a:r>
             <a:r>
-              <a:rPr lang="et-EE" sz="2400" dirty="0"/>
+              <a:rPr lang="et-EE" sz="2600" dirty="0"/>
               <a:t>; 3 - non-</a:t>
             </a:r>
             <a:r>
-              <a:rPr lang="et-EE" sz="2400" dirty="0" err="1"/>
+              <a:rPr lang="et-EE" sz="2600" dirty="0" err="1"/>
               <a:t>angina</a:t>
             </a:r>
             <a:r>
-              <a:rPr lang="et-EE" sz="2400" dirty="0"/>
+              <a:rPr lang="et-EE" sz="2600" dirty="0"/>
               <a:t>; 4 - </a:t>
             </a:r>
             <a:r>
-              <a:rPr lang="et-EE" sz="2400" dirty="0" err="1"/>
+              <a:rPr lang="et-EE" sz="2600" dirty="0" err="1"/>
               <a:t>asymptomatic</a:t>
             </a:r>
             <a:r>
-              <a:rPr lang="et-EE" sz="2400" dirty="0"/>
+              <a:rPr lang="et-EE" sz="2600" dirty="0"/>
               <a:t>.</a:t>
             </a:r>
-            <a:endParaRPr lang="et-EE" sz="2400" i="1" dirty="0"/>
+            <a:endParaRPr lang="et-EE" sz="2600" i="1" dirty="0"/>
           </a:p>
           <a:p>
             <a:pPr marL="342900" indent="-342900">
@@ -4754,34 +4707,34 @@
               <a:buChar char="•"/>
             </a:pPr>
             <a:r>
-              <a:rPr lang="et-EE" sz="2400" i="1" dirty="0" err="1"/>
+              <a:rPr lang="et-EE" sz="2600" i="1" dirty="0" err="1"/>
               <a:t>resting</a:t>
             </a:r>
             <a:r>
-              <a:rPr lang="et-EE" sz="2400" i="1" dirty="0"/>
+              <a:rPr lang="et-EE" sz="2600" i="1" dirty="0"/>
               <a:t> </a:t>
             </a:r>
             <a:r>
-              <a:rPr lang="et-EE" sz="2400" i="1" dirty="0" err="1"/>
+              <a:rPr lang="et-EE" sz="2600" i="1" dirty="0" err="1"/>
               <a:t>bs</a:t>
             </a:r>
             <a:r>
-              <a:rPr lang="et-EE" sz="2400" i="1" dirty="0"/>
+              <a:rPr lang="et-EE" sz="2600" i="1" dirty="0"/>
               <a:t> s (</a:t>
             </a:r>
             <a:r>
-              <a:rPr lang="et-EE" sz="2400" i="1" dirty="0" err="1"/>
+              <a:rPr lang="et-EE" sz="2600" i="1" dirty="0" err="1"/>
               <a:t>numeric</a:t>
             </a:r>
             <a:r>
-              <a:rPr lang="et-EE" sz="2400" i="1" dirty="0"/>
+              <a:rPr lang="et-EE" sz="2600" i="1" dirty="0"/>
               <a:t>) -  </a:t>
             </a:r>
             <a:r>
-              <a:rPr lang="en-US" sz="2400" dirty="0"/>
+              <a:rPr lang="en-US" sz="2600" dirty="0"/>
               <a:t>Level of blood pressure at resting mode in mm/GG.</a:t>
             </a:r>
-            <a:endParaRPr lang="et-EE" sz="2400" i="1" dirty="0"/>
+            <a:endParaRPr lang="et-EE" sz="2600" i="1" dirty="0"/>
           </a:p>
           <a:p>
             <a:pPr marL="342900" indent="-342900">
@@ -4789,26 +4742,26 @@
               <a:buChar char="•"/>
             </a:pPr>
             <a:r>
-              <a:rPr lang="et-EE" sz="2400" i="1" dirty="0" err="1"/>
+              <a:rPr lang="et-EE" sz="2600" i="1" dirty="0" err="1"/>
               <a:t>cholesterol</a:t>
             </a:r>
             <a:r>
-              <a:rPr lang="et-EE" sz="2400" i="1" dirty="0"/>
+              <a:rPr lang="et-EE" sz="2600" i="1" dirty="0"/>
               <a:t> (</a:t>
             </a:r>
             <a:r>
-              <a:rPr lang="et-EE" sz="2400" i="1" dirty="0" err="1"/>
+              <a:rPr lang="et-EE" sz="2600" i="1" dirty="0" err="1"/>
               <a:t>numeric</a:t>
             </a:r>
             <a:r>
-              <a:rPr lang="et-EE" sz="2400" i="1" dirty="0"/>
+              <a:rPr lang="et-EE" sz="2600" i="1" dirty="0"/>
               <a:t>) - </a:t>
             </a:r>
             <a:r>
-              <a:rPr lang="nl-NL" sz="2400" dirty="0"/>
+              <a:rPr lang="nl-NL" sz="2600" dirty="0"/>
               <a:t>Serum cholesterol in mg/dl.</a:t>
             </a:r>
-            <a:endParaRPr lang="et-EE" sz="2400" i="1" dirty="0"/>
+            <a:endParaRPr lang="et-EE" sz="2600" i="1" dirty="0"/>
           </a:p>
           <a:p>
             <a:pPr marL="342900" indent="-342900">
@@ -4816,42 +4769,42 @@
               <a:buChar char="•"/>
             </a:pPr>
             <a:r>
-              <a:rPr lang="et-EE" sz="2400" i="1" dirty="0" err="1"/>
+              <a:rPr lang="et-EE" sz="2600" i="1" dirty="0" err="1"/>
               <a:t>fasting</a:t>
             </a:r>
             <a:r>
-              <a:rPr lang="et-EE" sz="2400" i="1" dirty="0"/>
+              <a:rPr lang="et-EE" sz="2600" i="1" dirty="0"/>
               <a:t> </a:t>
             </a:r>
             <a:r>
-              <a:rPr lang="et-EE" sz="2400" i="1" dirty="0" err="1"/>
+              <a:rPr lang="et-EE" sz="2600" i="1" dirty="0" err="1"/>
               <a:t>blood</a:t>
             </a:r>
             <a:r>
-              <a:rPr lang="et-EE" sz="2400" i="1" dirty="0"/>
+              <a:rPr lang="et-EE" sz="2600" i="1" dirty="0"/>
               <a:t> </a:t>
             </a:r>
             <a:r>
-              <a:rPr lang="et-EE" sz="2400" i="1" dirty="0" err="1"/>
+              <a:rPr lang="et-EE" sz="2600" i="1" dirty="0" err="1"/>
               <a:t>sugar</a:t>
             </a:r>
             <a:r>
-              <a:rPr lang="et-EE" sz="2400" i="1" dirty="0"/>
+              <a:rPr lang="et-EE" sz="2600" i="1" dirty="0"/>
               <a:t> (</a:t>
             </a:r>
             <a:r>
-              <a:rPr lang="et-EE" sz="2400" i="1" dirty="0" err="1"/>
+              <a:rPr lang="et-EE" sz="2600" i="1" dirty="0" err="1"/>
               <a:t>nominal</a:t>
             </a:r>
             <a:r>
-              <a:rPr lang="et-EE" sz="2400" i="1" dirty="0"/>
+              <a:rPr lang="et-EE" sz="2600" i="1" dirty="0"/>
               <a:t>) - </a:t>
             </a:r>
             <a:r>
-              <a:rPr lang="en-US" sz="2400" dirty="0"/>
+              <a:rPr lang="en-US" sz="2600" dirty="0"/>
               <a:t>Blood sugar levels on fasting &gt; 120 mg/dl represent 1 in case of true and 0 as false.</a:t>
             </a:r>
-            <a:endParaRPr lang="et-EE" sz="2400" i="1" dirty="0"/>
+            <a:endParaRPr lang="et-EE" sz="2600" i="1" dirty="0"/>
           </a:p>
           <a:p>
             <a:pPr marL="342900" indent="-342900">
@@ -4859,50 +4812,50 @@
               <a:buChar char="•"/>
             </a:pPr>
             <a:r>
-              <a:rPr lang="et-EE" sz="2400" i="1" dirty="0" err="1"/>
+              <a:rPr lang="et-EE" sz="2600" i="1" dirty="0" err="1"/>
               <a:t>resting</a:t>
             </a:r>
             <a:r>
-              <a:rPr lang="et-EE" sz="2400" i="1" dirty="0"/>
+              <a:rPr lang="et-EE" sz="2600" i="1" dirty="0"/>
               <a:t> </a:t>
             </a:r>
             <a:r>
-              <a:rPr lang="et-EE" sz="2400" i="1" dirty="0" err="1"/>
+              <a:rPr lang="et-EE" sz="2600" i="1" dirty="0" err="1"/>
               <a:t>ecg</a:t>
             </a:r>
             <a:r>
-              <a:rPr lang="et-EE" sz="2400" i="1" dirty="0"/>
+              <a:rPr lang="et-EE" sz="2600" i="1" dirty="0"/>
               <a:t>. (</a:t>
             </a:r>
             <a:r>
-              <a:rPr lang="et-EE" sz="2400" i="1" dirty="0" err="1"/>
+              <a:rPr lang="et-EE" sz="2600" i="1" dirty="0" err="1"/>
               <a:t>categorical</a:t>
             </a:r>
             <a:r>
-              <a:rPr lang="et-EE" sz="2400" i="1" dirty="0"/>
+              <a:rPr lang="et-EE" sz="2600" i="1" dirty="0"/>
               <a:t>) - </a:t>
             </a:r>
             <a:r>
-              <a:rPr lang="en-US" sz="2400" dirty="0"/>
+              <a:rPr lang="en-US" sz="2600" dirty="0"/>
               <a:t>0: Normal</a:t>
             </a:r>
             <a:r>
-              <a:rPr lang="et-EE" sz="2400" dirty="0"/>
+              <a:rPr lang="et-EE" sz="2600" dirty="0"/>
               <a:t>,</a:t>
             </a:r>
             <a:r>
-              <a:rPr lang="en-US" sz="2400" dirty="0"/>
+              <a:rPr lang="en-US" sz="2600" dirty="0"/>
               <a:t> 1: Abnormality in ST-T wave</a:t>
             </a:r>
             <a:r>
-              <a:rPr lang="et-EE" sz="2400" dirty="0"/>
+              <a:rPr lang="et-EE" sz="2600" dirty="0"/>
               <a:t>,</a:t>
             </a:r>
             <a:r>
-              <a:rPr lang="en-US" sz="2400" dirty="0"/>
+              <a:rPr lang="en-US" sz="2600" dirty="0"/>
               <a:t> 2: Left ventricular hypertrophy</a:t>
             </a:r>
-            <a:endParaRPr lang="et-EE" sz="2400" i="1" dirty="0"/>
+            <a:endParaRPr lang="et-EE" sz="2600" i="1" dirty="0"/>
           </a:p>
           <a:p>
             <a:pPr marL="342900" indent="-342900">
@@ -4910,66 +4863,66 @@
               <a:buChar char="•"/>
             </a:pPr>
             <a:r>
-              <a:rPr lang="et-EE" sz="2400" i="1" dirty="0" err="1"/>
+              <a:rPr lang="et-EE" sz="2600" i="1" dirty="0" err="1"/>
               <a:t>max</a:t>
             </a:r>
             <a:r>
-              <a:rPr lang="et-EE" sz="2400" i="1" dirty="0"/>
+              <a:rPr lang="et-EE" sz="2600" i="1" dirty="0"/>
               <a:t> </a:t>
             </a:r>
             <a:r>
-              <a:rPr lang="et-EE" sz="2400" i="1" dirty="0" err="1"/>
+              <a:rPr lang="et-EE" sz="2600" i="1" dirty="0" err="1"/>
               <a:t>heart</a:t>
             </a:r>
             <a:r>
-              <a:rPr lang="et-EE" sz="2400" i="1" dirty="0"/>
+              <a:rPr lang="et-EE" sz="2600" i="1" dirty="0"/>
               <a:t> </a:t>
             </a:r>
             <a:r>
-              <a:rPr lang="et-EE" sz="2400" i="1" dirty="0" err="1"/>
+              <a:rPr lang="et-EE" sz="2600" i="1" dirty="0" err="1"/>
               <a:t>rate</a:t>
             </a:r>
             <a:r>
-              <a:rPr lang="et-EE" sz="2400" i="1" dirty="0"/>
+              <a:rPr lang="et-EE" sz="2600" i="1" dirty="0"/>
               <a:t> (</a:t>
             </a:r>
             <a:r>
-              <a:rPr lang="et-EE" sz="2400" i="1" dirty="0" err="1"/>
+              <a:rPr lang="et-EE" sz="2600" i="1" dirty="0" err="1"/>
               <a:t>numeric</a:t>
             </a:r>
             <a:r>
-              <a:rPr lang="et-EE" sz="2400" i="1" dirty="0"/>
+              <a:rPr lang="et-EE" sz="2600" i="1" dirty="0"/>
               <a:t>) - </a:t>
             </a:r>
             <a:r>
-              <a:rPr lang="et-EE" sz="2400" dirty="0" err="1"/>
+              <a:rPr lang="et-EE" sz="2600" dirty="0" err="1"/>
               <a:t>Maximum</a:t>
             </a:r>
             <a:r>
-              <a:rPr lang="et-EE" sz="2400" dirty="0"/>
+              <a:rPr lang="et-EE" sz="2600" dirty="0"/>
               <a:t> </a:t>
             </a:r>
             <a:r>
-              <a:rPr lang="et-EE" sz="2400" dirty="0" err="1"/>
+              <a:rPr lang="et-EE" sz="2600" dirty="0" err="1"/>
               <a:t>heart</a:t>
             </a:r>
             <a:r>
-              <a:rPr lang="et-EE" sz="2400" dirty="0"/>
+              <a:rPr lang="et-EE" sz="2600" dirty="0"/>
               <a:t> </a:t>
             </a:r>
             <a:r>
-              <a:rPr lang="et-EE" sz="2400" dirty="0" err="1"/>
+              <a:rPr lang="et-EE" sz="2600" dirty="0" err="1"/>
               <a:t>rate</a:t>
             </a:r>
             <a:r>
-              <a:rPr lang="et-EE" sz="2400" dirty="0"/>
+              <a:rPr lang="et-EE" sz="2600" dirty="0"/>
               <a:t> </a:t>
             </a:r>
             <a:r>
-              <a:rPr lang="et-EE" sz="2400" dirty="0" err="1"/>
+              <a:rPr lang="et-EE" sz="2600" dirty="0" err="1"/>
               <a:t>achieved</a:t>
             </a:r>
-            <a:endParaRPr lang="et-EE" sz="2400" i="1" dirty="0"/>
+            <a:endParaRPr lang="et-EE" sz="2600" i="1" dirty="0"/>
           </a:p>
           <a:p>
             <a:pPr marL="342900" indent="-342900">
@@ -4977,34 +4930,34 @@
               <a:buChar char="•"/>
             </a:pPr>
             <a:r>
-              <a:rPr lang="et-EE" sz="2400" i="1" dirty="0" err="1"/>
+              <a:rPr lang="et-EE" sz="2600" i="1" dirty="0" err="1"/>
               <a:t>exercise</a:t>
             </a:r>
             <a:r>
-              <a:rPr lang="et-EE" sz="2400" i="1" dirty="0"/>
+              <a:rPr lang="et-EE" sz="2600" i="1" dirty="0"/>
               <a:t> </a:t>
             </a:r>
             <a:r>
-              <a:rPr lang="et-EE" sz="2400" i="1" dirty="0" err="1"/>
+              <a:rPr lang="et-EE" sz="2600" i="1" dirty="0" err="1"/>
               <a:t>angina</a:t>
             </a:r>
             <a:r>
-              <a:rPr lang="et-EE" sz="2400" i="1" dirty="0"/>
+              <a:rPr lang="et-EE" sz="2600" i="1" dirty="0"/>
               <a:t> (</a:t>
             </a:r>
             <a:r>
-              <a:rPr lang="et-EE" sz="2400" i="1" dirty="0" err="1"/>
+              <a:rPr lang="et-EE" sz="2600" i="1" dirty="0" err="1"/>
               <a:t>nominal</a:t>
             </a:r>
             <a:r>
-              <a:rPr lang="et-EE" sz="2400" i="1" dirty="0"/>
+              <a:rPr lang="et-EE" sz="2600" i="1" dirty="0"/>
               <a:t>) - </a:t>
             </a:r>
             <a:r>
-              <a:rPr lang="en-US" sz="2400" dirty="0"/>
+              <a:rPr lang="en-US" sz="2600" dirty="0"/>
               <a:t>Angina induced by exercise 0: no and 1: yes</a:t>
             </a:r>
-            <a:endParaRPr lang="et-EE" sz="2400" i="1" dirty="0"/>
+            <a:endParaRPr lang="et-EE" sz="2600" i="1" dirty="0"/>
           </a:p>
           <a:p>
             <a:pPr marL="342900" indent="-342900">
@@ -5012,26 +4965,26 @@
               <a:buChar char="•"/>
             </a:pPr>
             <a:r>
-              <a:rPr lang="et-EE" sz="2400" i="1" dirty="0" err="1"/>
+              <a:rPr lang="et-EE" sz="2600" i="1" dirty="0" err="1"/>
               <a:t>oldpeak</a:t>
             </a:r>
             <a:r>
-              <a:rPr lang="et-EE" sz="2400" i="1" dirty="0"/>
+              <a:rPr lang="et-EE" sz="2600" i="1" dirty="0"/>
               <a:t> (</a:t>
             </a:r>
             <a:r>
-              <a:rPr lang="et-EE" sz="2400" i="1" dirty="0" err="1"/>
+              <a:rPr lang="et-EE" sz="2600" i="1" dirty="0" err="1"/>
               <a:t>numeric</a:t>
             </a:r>
             <a:r>
-              <a:rPr lang="et-EE" sz="2400" i="1" dirty="0"/>
+              <a:rPr lang="et-EE" sz="2600" i="1" dirty="0"/>
               <a:t>) - </a:t>
             </a:r>
             <a:r>
-              <a:rPr lang="en-US" sz="2400" dirty="0"/>
+              <a:rPr lang="en-US" sz="2600" dirty="0"/>
               <a:t>Exercise induced ST-depression in comparison with the state of rest.</a:t>
             </a:r>
-            <a:endParaRPr lang="et-EE" sz="2400" i="1" dirty="0"/>
+            <a:endParaRPr lang="et-EE" sz="2600" i="1" dirty="0"/>
           </a:p>
           <a:p>
             <a:pPr marL="342900" indent="-342900">
@@ -5039,34 +4992,34 @@
               <a:buChar char="•"/>
             </a:pPr>
             <a:r>
-              <a:rPr lang="et-EE" sz="2400" i="1" dirty="0"/>
+              <a:rPr lang="et-EE" sz="2600" i="1" dirty="0"/>
               <a:t>ST </a:t>
             </a:r>
             <a:r>
-              <a:rPr lang="et-EE" sz="2400" i="1" dirty="0" err="1"/>
+              <a:rPr lang="et-EE" sz="2600" i="1" dirty="0" err="1"/>
               <a:t>slope</a:t>
             </a:r>
             <a:r>
-              <a:rPr lang="et-EE" sz="2400" i="1" dirty="0"/>
+              <a:rPr lang="et-EE" sz="2600" i="1" dirty="0"/>
               <a:t> (</a:t>
             </a:r>
             <a:r>
-              <a:rPr lang="et-EE" sz="2400" i="1" dirty="0" err="1"/>
+              <a:rPr lang="et-EE" sz="2600" i="1" dirty="0" err="1"/>
               <a:t>categorical</a:t>
             </a:r>
             <a:r>
-              <a:rPr lang="et-EE" sz="2400" i="1" dirty="0"/>
+              <a:rPr lang="et-EE" sz="2600" i="1" dirty="0"/>
               <a:t>) - </a:t>
             </a:r>
             <a:r>
-              <a:rPr lang="en-US" sz="2400" dirty="0"/>
+              <a:rPr lang="en-US" sz="2600" dirty="0"/>
               <a:t>0: Normal 1: Upsloping 2: Flat 3: </a:t>
             </a:r>
             <a:r>
-              <a:rPr lang="en-US" sz="2400" dirty="0" err="1"/>
+              <a:rPr lang="en-US" sz="2600" dirty="0" err="1"/>
               <a:t>Downsloping</a:t>
             </a:r>
-            <a:endParaRPr lang="et-EE" sz="2400" i="1" dirty="0"/>
+            <a:endParaRPr lang="et-EE" sz="2600" i="1" dirty="0"/>
           </a:p>
           <a:p>
             <a:pPr marL="342900" indent="-342900">
@@ -5074,26 +5027,26 @@
               <a:buChar char="•"/>
             </a:pPr>
             <a:r>
-              <a:rPr lang="et-EE" sz="2400" i="1" dirty="0" err="1"/>
+              <a:rPr lang="et-EE" sz="2600" i="1" dirty="0" err="1"/>
               <a:t>target</a:t>
             </a:r>
             <a:r>
-              <a:rPr lang="et-EE" sz="2400" i="1" dirty="0"/>
+              <a:rPr lang="et-EE" sz="2600" i="1" dirty="0"/>
               <a:t> (</a:t>
             </a:r>
             <a:r>
-              <a:rPr lang="et-EE" sz="2400" i="1" dirty="0" err="1"/>
+              <a:rPr lang="et-EE" sz="2600" i="1" dirty="0" err="1"/>
               <a:t>nominal</a:t>
             </a:r>
             <a:r>
-              <a:rPr lang="et-EE" sz="2400" i="1" dirty="0"/>
+              <a:rPr lang="et-EE" sz="2600" i="1" dirty="0"/>
               <a:t>) - </a:t>
             </a:r>
             <a:r>
-              <a:rPr lang="en-US" sz="2400" dirty="0"/>
+              <a:rPr lang="en-US" sz="2600" dirty="0"/>
               <a:t>Heart risk, 1: heart disease 0: normal</a:t>
             </a:r>
-            <a:endParaRPr lang="et-EE" sz="2400" i="1" dirty="0"/>
+            <a:endParaRPr lang="et-EE" sz="2600" i="1" dirty="0"/>
           </a:p>
         </p:txBody>
       </p:sp>
@@ -5214,6 +5167,219 @@
               <a:effectLst/>
               <a:latin typeface="Arial" panose="020B0604020202020204" pitchFamily="34" charset="0"/>
             </a:endParaRPr>
+          </a:p>
+        </p:txBody>
+      </p:sp>
+      <p:pic>
+        <p:nvPicPr>
+          <p:cNvPr id="15" name="Pilt 14">
+            <a:extLst>
+              <a:ext uri="{FF2B5EF4-FFF2-40B4-BE49-F238E27FC236}">
+                <a16:creationId xmlns:a16="http://schemas.microsoft.com/office/drawing/2014/main" id="{2443350B-9095-42FC-963D-63149B51344A}"/>
+              </a:ext>
+            </a:extLst>
+          </p:cNvPr>
+          <p:cNvPicPr>
+            <a:picLocks noChangeAspect="1"/>
+          </p:cNvPicPr>
+          <p:nvPr/>
+        </p:nvPicPr>
+        <p:blipFill>
+          <a:blip r:embed="rId5"/>
+          <a:stretch>
+            <a:fillRect/>
+          </a:stretch>
+        </p:blipFill>
+        <p:spPr>
+          <a:xfrm>
+            <a:off x="17147874" y="34066264"/>
+            <a:ext cx="11152212" cy="7564787"/>
+          </a:xfrm>
+          <a:prstGeom prst="rect">
+            <a:avLst/>
+          </a:prstGeom>
+        </p:spPr>
+      </p:pic>
+      <p:sp>
+        <p:nvSpPr>
+          <p:cNvPr id="24" name="TextBox 23">
+            <a:extLst>
+              <a:ext uri="{FF2B5EF4-FFF2-40B4-BE49-F238E27FC236}">
+                <a16:creationId xmlns:a16="http://schemas.microsoft.com/office/drawing/2014/main" id="{B2ADA444-D1AE-4D16-932E-ED8E1618E27A}"/>
+              </a:ext>
+            </a:extLst>
+          </p:cNvPr>
+          <p:cNvSpPr txBox="1"/>
+          <p:nvPr/>
+        </p:nvSpPr>
+        <p:spPr>
+          <a:xfrm>
+            <a:off x="1975128" y="35027388"/>
+            <a:ext cx="8764208" cy="7417415"/>
+          </a:xfrm>
+          <a:prstGeom prst="rect">
+            <a:avLst/>
+          </a:prstGeom>
+          <a:noFill/>
+        </p:spPr>
+        <p:txBody>
+          <a:bodyPr wrap="square" rtlCol="0">
+            <a:spAutoFit/>
+          </a:bodyPr>
+          <a:lstStyle/>
+          <a:p>
+            <a:pPr algn="just"/>
+            <a:r>
+              <a:rPr lang="en-US" sz="2800" i="1" dirty="0"/>
+              <a:t>As a result, we were able to create models with an accuracy of over 92%. Random Forest has the highest accuracy among the models we created, with a score of 0.9454.</a:t>
+            </a:r>
+          </a:p>
+          <a:p>
+            <a:pPr algn="just"/>
+            <a:r>
+              <a:rPr lang="en-US" sz="2800" i="1" dirty="0"/>
+              <a:t>There isn't a significant difference between all the models. If there was it could suggest overfitting where a certain model learns the training data too well and fails to generalize to new, unseen data. We see that some optimizations we tried didn't make much difference in the accuracy. For example, feature importance with the random forest model underperformed and also the regulations for Neural networks didn't perform better.</a:t>
+            </a:r>
+          </a:p>
+          <a:p>
+            <a:pPr algn="just"/>
+            <a:r>
+              <a:rPr lang="en-US" sz="2800" i="1" dirty="0"/>
+              <a:t>So in conclusion the random forest model was our best model with an accuracy of 0.9454, which meets our goal to train a model with an accuracy over 0.92.</a:t>
+            </a:r>
+          </a:p>
+          <a:p>
+            <a:pPr algn="just"/>
+            <a:br>
+              <a:rPr lang="en-US" sz="2800" i="1" dirty="0"/>
+            </a:br>
+            <a:endParaRPr lang="et-EE" sz="2800" i="1" dirty="0"/>
+          </a:p>
+        </p:txBody>
+      </p:sp>
+      <p:pic>
+        <p:nvPicPr>
+          <p:cNvPr id="26" name="Pilt 25">
+            <a:extLst>
+              <a:ext uri="{FF2B5EF4-FFF2-40B4-BE49-F238E27FC236}">
+                <a16:creationId xmlns:a16="http://schemas.microsoft.com/office/drawing/2014/main" id="{A645F7EF-DAD5-4F4C-8A06-7D3012D4606A}"/>
+              </a:ext>
+            </a:extLst>
+          </p:cNvPr>
+          <p:cNvPicPr>
+            <a:picLocks noChangeAspect="1"/>
+          </p:cNvPicPr>
+          <p:nvPr/>
+        </p:nvPicPr>
+        <p:blipFill>
+          <a:blip r:embed="rId6"/>
+          <a:stretch>
+            <a:fillRect/>
+          </a:stretch>
+        </p:blipFill>
+        <p:spPr>
+          <a:xfrm>
+            <a:off x="11837959" y="35183763"/>
+            <a:ext cx="4737631" cy="3993041"/>
+          </a:xfrm>
+          <a:prstGeom prst="rect">
+            <a:avLst/>
+          </a:prstGeom>
+        </p:spPr>
+      </p:pic>
+      <p:sp>
+        <p:nvSpPr>
+          <p:cNvPr id="27" name="TextBox 26">
+            <a:extLst>
+              <a:ext uri="{FF2B5EF4-FFF2-40B4-BE49-F238E27FC236}">
+                <a16:creationId xmlns:a16="http://schemas.microsoft.com/office/drawing/2014/main" id="{994CF44A-40AF-441D-B7A1-7CC3493E49EF}"/>
+              </a:ext>
+            </a:extLst>
+          </p:cNvPr>
+          <p:cNvSpPr txBox="1"/>
+          <p:nvPr/>
+        </p:nvSpPr>
+        <p:spPr>
+          <a:xfrm>
+            <a:off x="11180682" y="28638230"/>
+            <a:ext cx="16445871" cy="3108543"/>
+          </a:xfrm>
+          <a:prstGeom prst="rect">
+            <a:avLst/>
+          </a:prstGeom>
+          <a:noFill/>
+        </p:spPr>
+        <p:txBody>
+          <a:bodyPr wrap="square" rtlCol="0">
+            <a:spAutoFit/>
+          </a:bodyPr>
+          <a:lstStyle/>
+          <a:p>
+            <a:pPr algn="just"/>
+            <a:r>
+              <a:rPr lang="en-US" sz="2800" i="1" dirty="0"/>
+              <a:t>From the correlation matrix, we have found the biggest association between the ST segment slope and the risk of heart disease. The graphical representation on the left further accentuates this finding, suggesting that individuals with a </a:t>
+            </a:r>
+            <a:r>
+              <a:rPr lang="en-US" sz="2800" i="1" dirty="0" err="1"/>
+              <a:t>downsloping</a:t>
+            </a:r>
+            <a:r>
+              <a:rPr lang="en-US" sz="2800" i="1" dirty="0"/>
+              <a:t> ST segment (value 3) are approximately three times more likely to have a heart disease. This observation aligns with expectations, considering that, in many cases, a normal ST segment slope trends slightly upwards—a reflection of the critical mechanics required for optimal heart function.</a:t>
+            </a:r>
+          </a:p>
+          <a:p>
+            <a:pPr algn="just"/>
+            <a:br>
+              <a:rPr lang="en-US" sz="2800" i="1" dirty="0"/>
+            </a:br>
+            <a:endParaRPr lang="et-EE" sz="2800" i="1" dirty="0"/>
+          </a:p>
+        </p:txBody>
+      </p:sp>
+      <p:sp>
+        <p:nvSpPr>
+          <p:cNvPr id="28" name="TextBox 27">
+            <a:extLst>
+              <a:ext uri="{FF2B5EF4-FFF2-40B4-BE49-F238E27FC236}">
+                <a16:creationId xmlns:a16="http://schemas.microsoft.com/office/drawing/2014/main" id="{040FD652-1D58-4C6F-81F0-032B6A5E8DC9}"/>
+              </a:ext>
+            </a:extLst>
+          </p:cNvPr>
+          <p:cNvSpPr txBox="1"/>
+          <p:nvPr/>
+        </p:nvSpPr>
+        <p:spPr>
+          <a:xfrm>
+            <a:off x="2295728" y="18600623"/>
+            <a:ext cx="14279862" cy="3108543"/>
+          </a:xfrm>
+          <a:prstGeom prst="rect">
+            <a:avLst/>
+          </a:prstGeom>
+          <a:noFill/>
+        </p:spPr>
+        <p:txBody>
+          <a:bodyPr wrap="square" rtlCol="0">
+            <a:spAutoFit/>
+          </a:bodyPr>
+          <a:lstStyle/>
+          <a:p>
+            <a:pPr algn="just"/>
+            <a:r>
+              <a:rPr lang="en-US" sz="2800" i="1" dirty="0"/>
+              <a:t>The negative correlation with max heart rate supports the idea that lower maximum heart rates may be associated with heart disease, which is a common belief that ageing could cause risk for different diseases. The positive correlation between chest pain type, exercise angina, </a:t>
+            </a:r>
+            <a:r>
+              <a:rPr lang="en-US" sz="2800" i="1" dirty="0" err="1"/>
+              <a:t>oldpeak</a:t>
+            </a:r>
+            <a:r>
+              <a:rPr lang="en-US" sz="2800" i="1" dirty="0"/>
+              <a:t> and ST slope suggests that individuals who experience atypical pain (not typical chest pain) in the chest or angina during exercise have more likely heart diseases and individuals who have abnormalities in ST slope too. The matrix shows that the biggest influence on heart-related diseases may be caused by abnormal ST slope.</a:t>
+            </a:r>
+            <a:endParaRPr lang="et-EE" sz="2800" i="1" dirty="0"/>
           </a:p>
         </p:txBody>
       </p:sp>

</xml_diff>